<commit_message>
gw tambah slide power pointnya
</commit_message>
<xml_diff>
--- a/rencana wiki kalkulator.pptx
+++ b/rencana wiki kalkulator.pptx
@@ -6,6 +6,7 @@
   </p:sldMasterIdLst>
   <p:sldIdLst>
     <p:sldId id="256" r:id="rId2"/>
+    <p:sldId id="257" r:id="rId3"/>
   </p:sldIdLst>
   <p:sldSz cx="12192000" cy="6858000"/>
   <p:notesSz cx="6858000" cy="9144000"/>
@@ -104,6 +105,11 @@
       </a:defRPr>
     </a:lvl9pPr>
   </p:defaultTextStyle>
+  <p:extLst>
+    <p:ext uri="{EFAFB233-063F-42B5-8137-9DF3F51BA10A}">
+      <p15:sldGuideLst xmlns:p15="http://schemas.microsoft.com/office/powerpoint/2012/main"/>
+    </p:ext>
+  </p:extLst>
 </p:presentation>
 </file>
 
@@ -238,7 +244,7 @@
           <a:p>
             <a:fld id="{4D377F4F-F42B-4DED-9D17-283B890F5BB5}" type="datetimeFigureOut">
               <a:rPr lang="en-US" smtClean="0"/>
-              <a:t>6/7/2017</a:t>
+              <a:t>6/8/2017</a:t>
             </a:fld>
             <a:endParaRPr lang="en-US"/>
           </a:p>
@@ -408,7 +414,7 @@
           <a:p>
             <a:fld id="{4D377F4F-F42B-4DED-9D17-283B890F5BB5}" type="datetimeFigureOut">
               <a:rPr lang="en-US" smtClean="0"/>
-              <a:t>6/7/2017</a:t>
+              <a:t>6/8/2017</a:t>
             </a:fld>
             <a:endParaRPr lang="en-US"/>
           </a:p>
@@ -588,7 +594,7 @@
           <a:p>
             <a:fld id="{4D377F4F-F42B-4DED-9D17-283B890F5BB5}" type="datetimeFigureOut">
               <a:rPr lang="en-US" smtClean="0"/>
-              <a:t>6/7/2017</a:t>
+              <a:t>6/8/2017</a:t>
             </a:fld>
             <a:endParaRPr lang="en-US"/>
           </a:p>
@@ -758,7 +764,7 @@
           <a:p>
             <a:fld id="{4D377F4F-F42B-4DED-9D17-283B890F5BB5}" type="datetimeFigureOut">
               <a:rPr lang="en-US" smtClean="0"/>
-              <a:t>6/7/2017</a:t>
+              <a:t>6/8/2017</a:t>
             </a:fld>
             <a:endParaRPr lang="en-US"/>
           </a:p>
@@ -1004,7 +1010,7 @@
           <a:p>
             <a:fld id="{4D377F4F-F42B-4DED-9D17-283B890F5BB5}" type="datetimeFigureOut">
               <a:rPr lang="en-US" smtClean="0"/>
-              <a:t>6/7/2017</a:t>
+              <a:t>6/8/2017</a:t>
             </a:fld>
             <a:endParaRPr lang="en-US"/>
           </a:p>
@@ -1236,7 +1242,7 @@
           <a:p>
             <a:fld id="{4D377F4F-F42B-4DED-9D17-283B890F5BB5}" type="datetimeFigureOut">
               <a:rPr lang="en-US" smtClean="0"/>
-              <a:t>6/7/2017</a:t>
+              <a:t>6/8/2017</a:t>
             </a:fld>
             <a:endParaRPr lang="en-US"/>
           </a:p>
@@ -1603,7 +1609,7 @@
           <a:p>
             <a:fld id="{4D377F4F-F42B-4DED-9D17-283B890F5BB5}" type="datetimeFigureOut">
               <a:rPr lang="en-US" smtClean="0"/>
-              <a:t>6/7/2017</a:t>
+              <a:t>6/8/2017</a:t>
             </a:fld>
             <a:endParaRPr lang="en-US"/>
           </a:p>
@@ -1721,7 +1727,7 @@
           <a:p>
             <a:fld id="{4D377F4F-F42B-4DED-9D17-283B890F5BB5}" type="datetimeFigureOut">
               <a:rPr lang="en-US" smtClean="0"/>
-              <a:t>6/7/2017</a:t>
+              <a:t>6/8/2017</a:t>
             </a:fld>
             <a:endParaRPr lang="en-US"/>
           </a:p>
@@ -1816,7 +1822,7 @@
           <a:p>
             <a:fld id="{4D377F4F-F42B-4DED-9D17-283B890F5BB5}" type="datetimeFigureOut">
               <a:rPr lang="en-US" smtClean="0"/>
-              <a:t>6/7/2017</a:t>
+              <a:t>6/8/2017</a:t>
             </a:fld>
             <a:endParaRPr lang="en-US"/>
           </a:p>
@@ -2093,7 +2099,7 @@
           <a:p>
             <a:fld id="{4D377F4F-F42B-4DED-9D17-283B890F5BB5}" type="datetimeFigureOut">
               <a:rPr lang="en-US" smtClean="0"/>
-              <a:t>6/7/2017</a:t>
+              <a:t>6/8/2017</a:t>
             </a:fld>
             <a:endParaRPr lang="en-US"/>
           </a:p>
@@ -2346,7 +2352,7 @@
           <a:p>
             <a:fld id="{4D377F4F-F42B-4DED-9D17-283B890F5BB5}" type="datetimeFigureOut">
               <a:rPr lang="en-US" smtClean="0"/>
-              <a:t>6/7/2017</a:t>
+              <a:t>6/8/2017</a:t>
             </a:fld>
             <a:endParaRPr lang="en-US"/>
           </a:p>
@@ -2559,7 +2565,7 @@
           <a:p>
             <a:fld id="{4D377F4F-F42B-4DED-9D17-283B890F5BB5}" type="datetimeFigureOut">
               <a:rPr lang="en-US" smtClean="0"/>
-              <a:t>6/7/2017</a:t>
+              <a:t>6/8/2017</a:t>
             </a:fld>
             <a:endParaRPr lang="en-US"/>
           </a:p>
@@ -2966,14 +2972,14 @@
       </p:grpSpPr>
       <p:sp>
         <p:nvSpPr>
-          <p:cNvPr id="4" name="TextBox 3"/>
-          <p:cNvSpPr txBox="1"/>
+          <p:cNvPr id="2" name="Rectangle 1"/>
+          <p:cNvSpPr/>
           <p:nvPr/>
         </p:nvSpPr>
         <p:spPr>
           <a:xfrm>
-            <a:off x="4955059" y="1532238"/>
-            <a:ext cx="2443811" cy="369332"/>
+            <a:off x="3632654" y="2880838"/>
+            <a:ext cx="4901984" cy="923330"/>
           </a:xfrm>
           <a:prstGeom prst="rect">
             <a:avLst/>
@@ -2981,24 +2987,65 @@
           <a:noFill/>
         </p:spPr>
         <p:txBody>
-          <a:bodyPr wrap="none" rtlCol="0">
+          <a:bodyPr wrap="none" lIns="91440" tIns="45720" rIns="91440" bIns="45720">
             <a:spAutoFit/>
           </a:bodyPr>
           <a:lstStyle/>
           <a:p>
-            <a:r>
-              <a:rPr lang="en-US" dirty="0" err="1" smtClean="0"/>
-              <a:t>Rencana</a:t>
-            </a:r>
-            <a:r>
-              <a:rPr lang="en-US" dirty="0" smtClean="0"/>
-              <a:t> Wiki </a:t>
-            </a:r>
-            <a:r>
-              <a:rPr lang="en-US" dirty="0" err="1" smtClean="0"/>
-              <a:t>Kalkulator</a:t>
-            </a:r>
-            <a:endParaRPr lang="en-US" dirty="0"/>
+            <a:pPr algn="ctr"/>
+            <a:r>
+              <a:rPr lang="en-US" sz="5400" b="0" cap="none" spc="0" dirty="0" smtClean="0">
+                <a:ln w="0"/>
+                <a:gradFill>
+                  <a:gsLst>
+                    <a:gs pos="0">
+                      <a:schemeClr val="accent5">
+                        <a:lumMod val="50000"/>
+                      </a:schemeClr>
+                    </a:gs>
+                    <a:gs pos="50000">
+                      <a:schemeClr val="accent5"/>
+                    </a:gs>
+                    <a:gs pos="100000">
+                      <a:schemeClr val="accent5">
+                        <a:lumMod val="60000"/>
+                        <a:lumOff val="40000"/>
+                      </a:schemeClr>
+                    </a:gs>
+                  </a:gsLst>
+                  <a:lin ang="5400000"/>
+                </a:gradFill>
+                <a:effectLst>
+                  <a:reflection blurRad="6350" stA="53000" endA="300" endPos="35500" dir="5400000" sy="-90000" algn="bl" rotWithShape="0"/>
+                </a:effectLst>
+              </a:rPr>
+              <a:t>About Calculator</a:t>
+            </a:r>
+            <a:endParaRPr lang="en-US" sz="5400" b="0" cap="none" spc="0" dirty="0">
+              <a:ln w="0"/>
+              <a:gradFill>
+                <a:gsLst>
+                  <a:gs pos="0">
+                    <a:schemeClr val="accent5">
+                      <a:lumMod val="50000"/>
+                    </a:schemeClr>
+                  </a:gs>
+                  <a:gs pos="50000">
+                    <a:schemeClr val="accent5"/>
+                  </a:gs>
+                  <a:gs pos="100000">
+                    <a:schemeClr val="accent5">
+                      <a:lumMod val="60000"/>
+                      <a:lumOff val="40000"/>
+                    </a:schemeClr>
+                  </a:gs>
+                </a:gsLst>
+                <a:lin ang="5400000"/>
+              </a:gradFill>
+              <a:effectLst>
+                <a:reflection blurRad="6350" stA="53000" endA="300" endPos="35500" dir="5400000" sy="-90000" algn="bl" rotWithShape="0"/>
+              </a:effectLst>
+            </a:endParaRPr>
           </a:p>
         </p:txBody>
       </p:sp>
@@ -3006,6 +3053,95 @@
     <p:extLst>
       <p:ext uri="{BB962C8B-B14F-4D97-AF65-F5344CB8AC3E}">
         <p14:creationId xmlns:p14="http://schemas.microsoft.com/office/powerpoint/2010/main" val="2637701863"/>
+      </p:ext>
+    </p:extLst>
+  </p:cSld>
+  <p:clrMapOvr>
+    <a:masterClrMapping/>
+  </p:clrMapOvr>
+</p:sld>
+</file>
+
+<file path=ppt/slides/slide2.xml><?xml version="1.0" encoding="utf-8"?>
+<p:sld xmlns:a="http://schemas.openxmlformats.org/drawingml/2006/main" xmlns:r="http://schemas.openxmlformats.org/officeDocument/2006/relationships" xmlns:p="http://schemas.openxmlformats.org/presentationml/2006/main">
+  <p:cSld>
+    <p:spTree>
+      <p:nvGrpSpPr>
+        <p:cNvPr id="1" name=""/>
+        <p:cNvGrpSpPr/>
+        <p:nvPr/>
+      </p:nvGrpSpPr>
+      <p:grpSpPr>
+        <a:xfrm>
+          <a:off x="0" y="0"/>
+          <a:ext cx="0" cy="0"/>
+          <a:chOff x="0" y="0"/>
+          <a:chExt cx="0" cy="0"/>
+        </a:xfrm>
+      </p:grpSpPr>
+      <p:sp>
+        <p:nvSpPr>
+          <p:cNvPr id="5" name="Rectangle 4"/>
+          <p:cNvSpPr/>
+          <p:nvPr/>
+        </p:nvSpPr>
+        <p:spPr>
+          <a:xfrm>
+            <a:off x="2912076" y="1869102"/>
+            <a:ext cx="6096000" cy="1200329"/>
+          </a:xfrm>
+          <a:prstGeom prst="rect">
+            <a:avLst/>
+          </a:prstGeom>
+        </p:spPr>
+        <p:txBody>
+          <a:bodyPr>
+            <a:spAutoFit/>
+          </a:bodyPr>
+          <a:lstStyle/>
+          <a:p>
+            <a:r>
+              <a:rPr lang="en-US" dirty="0"/>
+              <a:t>An electronic calculator is a small, </a:t>
+            </a:r>
+            <a:r>
+              <a:rPr lang="en-US" dirty="0" smtClean="0"/>
+              <a:t>portable electronic device used </a:t>
+            </a:r>
+            <a:r>
+              <a:rPr lang="en-US" dirty="0"/>
+              <a:t>to </a:t>
+            </a:r>
+            <a:r>
+              <a:rPr lang="en-US" dirty="0" smtClean="0"/>
+              <a:t>perform calculation, </a:t>
+            </a:r>
+            <a:r>
+              <a:rPr lang="en-US" dirty="0"/>
+              <a:t>ranging from </a:t>
+            </a:r>
+            <a:r>
+              <a:rPr lang="en-US" dirty="0" smtClean="0"/>
+              <a:t>basic arithmetic </a:t>
+            </a:r>
+            <a:r>
+              <a:rPr lang="en-US" dirty="0"/>
+              <a:t>to </a:t>
+            </a:r>
+            <a:r>
+              <a:rPr lang="en-US" dirty="0" smtClean="0"/>
+              <a:t>complex mathematics.</a:t>
+            </a:r>
+          </a:p>
+          <a:p>
+            <a:endParaRPr lang="en-US" dirty="0"/>
+          </a:p>
+        </p:txBody>
+      </p:sp>
+    </p:spTree>
+    <p:extLst>
+      <p:ext uri="{BB962C8B-B14F-4D97-AF65-F5344CB8AC3E}">
+        <p14:creationId xmlns:p14="http://schemas.microsoft.com/office/powerpoint/2010/main" val="3123006990"/>
       </p:ext>
     </p:extLst>
   </p:cSld>

</xml_diff>